<commit_message>
keep path with iMac
</commit_message>
<xml_diff>
--- a/note/Technical-Note.pptx
+++ b/note/Technical-Note.pptx
@@ -11,6 +11,7 @@
     <p:sldId id="259" r:id="rId5"/>
     <p:sldId id="260" r:id="rId6"/>
     <p:sldId id="261" r:id="rId7"/>
+    <p:sldId id="262" r:id="rId8"/>
   </p:sldIdLst>
   <p:sldSz cx="12192000" cy="6858000"/>
   <p:notesSz cx="6858000" cy="9144000"/>
@@ -264,7 +265,7 @@
           <a:p>
             <a:fld id="{077DBB04-3226-F24F-BB25-0A802932BE86}" type="datetimeFigureOut">
               <a:rPr kumimoji="1" lang="zh-CN" altLang="en-US" smtClean="0"/>
-              <a:t>2021/9/3</a:t>
+              <a:t>2021/9/6</a:t>
             </a:fld>
             <a:endParaRPr kumimoji="1" lang="zh-CN" altLang="en-US"/>
           </a:p>
@@ -462,7 +463,7 @@
           <a:p>
             <a:fld id="{077DBB04-3226-F24F-BB25-0A802932BE86}" type="datetimeFigureOut">
               <a:rPr kumimoji="1" lang="zh-CN" altLang="en-US" smtClean="0"/>
-              <a:t>2021/9/3</a:t>
+              <a:t>2021/9/6</a:t>
             </a:fld>
             <a:endParaRPr kumimoji="1" lang="zh-CN" altLang="en-US"/>
           </a:p>
@@ -670,7 +671,7 @@
           <a:p>
             <a:fld id="{077DBB04-3226-F24F-BB25-0A802932BE86}" type="datetimeFigureOut">
               <a:rPr kumimoji="1" lang="zh-CN" altLang="en-US" smtClean="0"/>
-              <a:t>2021/9/3</a:t>
+              <a:t>2021/9/6</a:t>
             </a:fld>
             <a:endParaRPr kumimoji="1" lang="zh-CN" altLang="en-US"/>
           </a:p>
@@ -868,7 +869,7 @@
           <a:p>
             <a:fld id="{077DBB04-3226-F24F-BB25-0A802932BE86}" type="datetimeFigureOut">
               <a:rPr kumimoji="1" lang="zh-CN" altLang="en-US" smtClean="0"/>
-              <a:t>2021/9/3</a:t>
+              <a:t>2021/9/6</a:t>
             </a:fld>
             <a:endParaRPr kumimoji="1" lang="zh-CN" altLang="en-US"/>
           </a:p>
@@ -1143,7 +1144,7 @@
           <a:p>
             <a:fld id="{077DBB04-3226-F24F-BB25-0A802932BE86}" type="datetimeFigureOut">
               <a:rPr kumimoji="1" lang="zh-CN" altLang="en-US" smtClean="0"/>
-              <a:t>2021/9/3</a:t>
+              <a:t>2021/9/6</a:t>
             </a:fld>
             <a:endParaRPr kumimoji="1" lang="zh-CN" altLang="en-US"/>
           </a:p>
@@ -1408,7 +1409,7 @@
           <a:p>
             <a:fld id="{077DBB04-3226-F24F-BB25-0A802932BE86}" type="datetimeFigureOut">
               <a:rPr kumimoji="1" lang="zh-CN" altLang="en-US" smtClean="0"/>
-              <a:t>2021/9/3</a:t>
+              <a:t>2021/9/6</a:t>
             </a:fld>
             <a:endParaRPr kumimoji="1" lang="zh-CN" altLang="en-US"/>
           </a:p>
@@ -1820,7 +1821,7 @@
           <a:p>
             <a:fld id="{077DBB04-3226-F24F-BB25-0A802932BE86}" type="datetimeFigureOut">
               <a:rPr kumimoji="1" lang="zh-CN" altLang="en-US" smtClean="0"/>
-              <a:t>2021/9/3</a:t>
+              <a:t>2021/9/6</a:t>
             </a:fld>
             <a:endParaRPr kumimoji="1" lang="zh-CN" altLang="en-US"/>
           </a:p>
@@ -1961,7 +1962,7 @@
           <a:p>
             <a:fld id="{077DBB04-3226-F24F-BB25-0A802932BE86}" type="datetimeFigureOut">
               <a:rPr kumimoji="1" lang="zh-CN" altLang="en-US" smtClean="0"/>
-              <a:t>2021/9/3</a:t>
+              <a:t>2021/9/6</a:t>
             </a:fld>
             <a:endParaRPr kumimoji="1" lang="zh-CN" altLang="en-US"/>
           </a:p>
@@ -2074,7 +2075,7 @@
           <a:p>
             <a:fld id="{077DBB04-3226-F24F-BB25-0A802932BE86}" type="datetimeFigureOut">
               <a:rPr kumimoji="1" lang="zh-CN" altLang="en-US" smtClean="0"/>
-              <a:t>2021/9/3</a:t>
+              <a:t>2021/9/6</a:t>
             </a:fld>
             <a:endParaRPr kumimoji="1" lang="zh-CN" altLang="en-US"/>
           </a:p>
@@ -2385,7 +2386,7 @@
           <a:p>
             <a:fld id="{077DBB04-3226-F24F-BB25-0A802932BE86}" type="datetimeFigureOut">
               <a:rPr kumimoji="1" lang="zh-CN" altLang="en-US" smtClean="0"/>
-              <a:t>2021/9/3</a:t>
+              <a:t>2021/9/6</a:t>
             </a:fld>
             <a:endParaRPr kumimoji="1" lang="zh-CN" altLang="en-US"/>
           </a:p>
@@ -2673,7 +2674,7 @@
           <a:p>
             <a:fld id="{077DBB04-3226-F24F-BB25-0A802932BE86}" type="datetimeFigureOut">
               <a:rPr kumimoji="1" lang="zh-CN" altLang="en-US" smtClean="0"/>
-              <a:t>2021/9/3</a:t>
+              <a:t>2021/9/6</a:t>
             </a:fld>
             <a:endParaRPr kumimoji="1" lang="zh-CN" altLang="en-US"/>
           </a:p>
@@ -2914,7 +2915,7 @@
           <a:p>
             <a:fld id="{077DBB04-3226-F24F-BB25-0A802932BE86}" type="datetimeFigureOut">
               <a:rPr kumimoji="1" lang="zh-CN" altLang="en-US" smtClean="0"/>
-              <a:t>2021/9/3</a:t>
+              <a:t>2021/9/6</a:t>
             </a:fld>
             <a:endParaRPr kumimoji="1" lang="zh-CN" altLang="en-US"/>
           </a:p>
@@ -7476,6 +7477,1053 @@
 </p:sld>
 </file>
 
+<file path=ppt/slides/slide7.xml><?xml version="1.0" encoding="utf-8"?>
+<p:sld xmlns:a="http://schemas.openxmlformats.org/drawingml/2006/main" xmlns:r="http://schemas.openxmlformats.org/officeDocument/2006/relationships" xmlns:p="http://schemas.openxmlformats.org/presentationml/2006/main">
+  <p:cSld>
+    <p:spTree>
+      <p:nvGrpSpPr>
+        <p:cNvPr id="1" name=""/>
+        <p:cNvGrpSpPr/>
+        <p:nvPr/>
+      </p:nvGrpSpPr>
+      <p:grpSpPr>
+        <a:xfrm>
+          <a:off x="0" y="0"/>
+          <a:ext cx="0" cy="0"/>
+          <a:chOff x="0" y="0"/>
+          <a:chExt cx="0" cy="0"/>
+        </a:xfrm>
+      </p:grpSpPr>
+      <p:sp>
+        <p:nvSpPr>
+          <p:cNvPr id="5" name="标题 1">
+            <a:extLst>
+              <a:ext uri="{FF2B5EF4-FFF2-40B4-BE49-F238E27FC236}">
+                <a16:creationId xmlns:a16="http://schemas.microsoft.com/office/drawing/2014/main" id="{27CDBFC1-32DF-3F4F-BB02-4E90FAD4318A}"/>
+              </a:ext>
+            </a:extLst>
+          </p:cNvPr>
+          <p:cNvSpPr>
+            <a:spLocks noGrp="1"/>
+          </p:cNvSpPr>
+          <p:nvPr>
+            <p:ph type="title"/>
+          </p:nvPr>
+        </p:nvSpPr>
+        <p:spPr>
+          <a:xfrm>
+            <a:off x="193184" y="43256"/>
+            <a:ext cx="7521261" cy="690943"/>
+          </a:xfrm>
+        </p:spPr>
+        <p:txBody>
+          <a:bodyPr>
+            <a:normAutofit/>
+          </a:bodyPr>
+          <a:lstStyle/>
+          <a:p>
+            <a:r>
+              <a:rPr kumimoji="1" lang="en-US" altLang="zh-CN" sz="3600" dirty="0">
+                <a:latin typeface="Palatino" pitchFamily="2" charset="0"/>
+                <a:ea typeface="Palatino" pitchFamily="2" charset="0"/>
+              </a:rPr>
+              <a:t>two site update phonon MPI test</a:t>
+            </a:r>
+            <a:endParaRPr kumimoji="1" lang="zh-CN" altLang="en-US" sz="3600" dirty="0">
+              <a:latin typeface="Palatino" pitchFamily="2" charset="0"/>
+              <a:ea typeface="Palatino" pitchFamily="2" charset="0"/>
+            </a:endParaRPr>
+          </a:p>
+        </p:txBody>
+      </p:sp>
+      <mc:AlternateContent xmlns:mc="http://schemas.openxmlformats.org/markup-compatibility/2006" xmlns:a14="http://schemas.microsoft.com/office/drawing/2010/main">
+        <mc:Choice Requires="a14">
+          <p:sp>
+            <p:nvSpPr>
+              <p:cNvPr id="6" name="文本框 5">
+                <a:extLst>
+                  <a:ext uri="{FF2B5EF4-FFF2-40B4-BE49-F238E27FC236}">
+                    <a16:creationId xmlns:a16="http://schemas.microsoft.com/office/drawing/2014/main" id="{D4F50D4E-6FBE-A042-A4CF-28DC60B8593C}"/>
+                  </a:ext>
+                </a:extLst>
+              </p:cNvPr>
+              <p:cNvSpPr txBox="1"/>
+              <p:nvPr/>
+            </p:nvSpPr>
+            <p:spPr>
+              <a:xfrm>
+                <a:off x="1107583" y="734199"/>
+                <a:ext cx="8023538" cy="1200329"/>
+              </a:xfrm>
+              <a:prstGeom prst="rect">
+                <a:avLst/>
+              </a:prstGeom>
+              <a:noFill/>
+            </p:spPr>
+            <p:txBody>
+              <a:bodyPr wrap="square" rtlCol="0">
+                <a:spAutoFit/>
+              </a:bodyPr>
+              <a:lstStyle/>
+              <a:p>
+                <a:r>
+                  <a:rPr kumimoji="1" lang="en-US" altLang="zh-CN" dirty="0">
+                    <a:latin typeface="Times New Roman" panose="02020603050405020304" pitchFamily="18" charset="0"/>
+                    <a:cs typeface="Times New Roman" panose="02020603050405020304" pitchFamily="18" charset="0"/>
+                  </a:rPr>
+                  <a:t>Model: SSH-Hubbard, </a:t>
+                </a:r>
+                <a14:m>
+                  <m:oMath xmlns:m="http://schemas.openxmlformats.org/officeDocument/2006/math">
+                    <m:r>
+                      <a:rPr kumimoji="1" lang="en-US" altLang="zh-CN" b="0" i="1" smtClean="0">
+                        <a:latin typeface="Cambria Math" panose="02040503050406030204" pitchFamily="18" charset="0"/>
+                        <a:cs typeface="Times New Roman" panose="02020603050405020304" pitchFamily="18" charset="0"/>
+                      </a:rPr>
+                      <m:t>𝜆</m:t>
+                    </m:r>
+                    <m:r>
+                      <a:rPr kumimoji="1" lang="en-US" altLang="zh-CN" b="0" i="1" smtClean="0">
+                        <a:latin typeface="Cambria Math" panose="02040503050406030204" pitchFamily="18" charset="0"/>
+                        <a:cs typeface="Times New Roman" panose="02020603050405020304" pitchFamily="18" charset="0"/>
+                      </a:rPr>
+                      <m:t>=0.3</m:t>
+                    </m:r>
+                  </m:oMath>
+                </a14:m>
+                <a:endParaRPr kumimoji="1" lang="en-US" altLang="zh-CN" dirty="0">
+                  <a:latin typeface="Times New Roman" panose="02020603050405020304" pitchFamily="18" charset="0"/>
+                  <a:cs typeface="Times New Roman" panose="02020603050405020304" pitchFamily="18" charset="0"/>
+                </a:endParaRPr>
+              </a:p>
+              <a:p>
+                <a:r>
+                  <a:rPr kumimoji="1" lang="en-US" altLang="zh-CN" dirty="0">
+                    <a:latin typeface="Times New Roman" panose="02020603050405020304" pitchFamily="18" charset="0"/>
+                    <a:cs typeface="Times New Roman" panose="02020603050405020304" pitchFamily="18" charset="0"/>
+                  </a:rPr>
+                  <a:t>System size: </a:t>
+                </a:r>
+                <a14:m>
+                  <m:oMath xmlns:m="http://schemas.openxmlformats.org/officeDocument/2006/math">
+                    <m:r>
+                      <a:rPr kumimoji="1" lang="en-US" altLang="zh-CN" b="0" i="1" smtClean="0">
+                        <a:latin typeface="Cambria Math" panose="02040503050406030204" pitchFamily="18" charset="0"/>
+                      </a:rPr>
+                      <m:t>4×48</m:t>
+                    </m:r>
+                  </m:oMath>
+                </a14:m>
+                <a:endParaRPr kumimoji="1" lang="en-US" altLang="zh-CN" dirty="0">
+                  <a:latin typeface="Times New Roman" panose="02020603050405020304" pitchFamily="18" charset="0"/>
+                  <a:cs typeface="Times New Roman" panose="02020603050405020304" pitchFamily="18" charset="0"/>
+                </a:endParaRPr>
+              </a:p>
+              <a:p>
+                <a:r>
+                  <a:rPr kumimoji="1" lang="en-US" altLang="zh-CN" dirty="0">
+                    <a:latin typeface="Times New Roman" panose="02020603050405020304" pitchFamily="18" charset="0"/>
+                    <a:cs typeface="Times New Roman" panose="02020603050405020304" pitchFamily="18" charset="0"/>
+                  </a:rPr>
+                  <a:t>Bond dimension: 8000</a:t>
+                </a:r>
+              </a:p>
+              <a:p>
+                <a:r>
+                  <a:rPr kumimoji="1" lang="en-US" altLang="zh-CN" dirty="0">
+                    <a:latin typeface="Times New Roman" panose="02020603050405020304" pitchFamily="18" charset="0"/>
+                    <a:cs typeface="Times New Roman" panose="02020603050405020304" pitchFamily="18" charset="0"/>
+                  </a:rPr>
+                  <a:t>HPC: </a:t>
+                </a:r>
+                <a:r>
+                  <a:rPr kumimoji="1" lang="en-US" altLang="zh-CN" dirty="0" err="1">
+                    <a:latin typeface="Times New Roman" panose="02020603050405020304" pitchFamily="18" charset="0"/>
+                    <a:cs typeface="Times New Roman" panose="02020603050405020304" pitchFamily="18" charset="0"/>
+                  </a:rPr>
+                  <a:t>paracloud@bscc-t</a:t>
+                </a:r>
+                <a:r>
+                  <a:rPr kumimoji="1" lang="en-US" altLang="zh-CN" dirty="0">
+                    <a:latin typeface="Times New Roman" panose="02020603050405020304" pitchFamily="18" charset="0"/>
+                    <a:cs typeface="Times New Roman" panose="02020603050405020304" pitchFamily="18" charset="0"/>
+                  </a:rPr>
+                  <a:t>(CPU: Intel, MEM: 384G, 96 core)</a:t>
+                </a:r>
+              </a:p>
+            </p:txBody>
+          </p:sp>
+        </mc:Choice>
+        <mc:Fallback xmlns="">
+          <p:sp>
+            <p:nvSpPr>
+              <p:cNvPr id="6" name="文本框 5">
+                <a:extLst>
+                  <a:ext uri="{FF2B5EF4-FFF2-40B4-BE49-F238E27FC236}">
+                    <a16:creationId xmlns:a16="http://schemas.microsoft.com/office/drawing/2014/main" id="{D4F50D4E-6FBE-A042-A4CF-28DC60B8593C}"/>
+                  </a:ext>
+                </a:extLst>
+              </p:cNvPr>
+              <p:cNvSpPr txBox="1">
+                <a:spLocks noRot="1" noChangeAspect="1" noMove="1" noResize="1" noEditPoints="1" noAdjustHandles="1" noChangeArrowheads="1" noChangeShapeType="1" noTextEdit="1"/>
+              </p:cNvSpPr>
+              <p:nvPr/>
+            </p:nvSpPr>
+            <p:spPr>
+              <a:xfrm>
+                <a:off x="1107583" y="734199"/>
+                <a:ext cx="8023538" cy="1200329"/>
+              </a:xfrm>
+              <a:prstGeom prst="rect">
+                <a:avLst/>
+              </a:prstGeom>
+              <a:blipFill>
+                <a:blip r:embed="rId2"/>
+                <a:stretch>
+                  <a:fillRect l="-632" t="-2083" b="-6250"/>
+                </a:stretch>
+              </a:blipFill>
+            </p:spPr>
+            <p:txBody>
+              <a:bodyPr/>
+              <a:lstStyle/>
+              <a:p>
+                <a:r>
+                  <a:rPr lang="zh-CN" altLang="en-US">
+                    <a:noFill/>
+                  </a:rPr>
+                  <a:t> </a:t>
+                </a:r>
+              </a:p>
+            </p:txBody>
+          </p:sp>
+        </mc:Fallback>
+      </mc:AlternateContent>
+      <p:graphicFrame>
+        <p:nvGraphicFramePr>
+          <p:cNvPr id="7" name="表格 5">
+            <a:extLst>
+              <a:ext uri="{FF2B5EF4-FFF2-40B4-BE49-F238E27FC236}">
+                <a16:creationId xmlns:a16="http://schemas.microsoft.com/office/drawing/2014/main" id="{A47D599D-4D98-A44B-B41F-8DE8FDD2B829}"/>
+              </a:ext>
+            </a:extLst>
+          </p:cNvPr>
+          <p:cNvGraphicFramePr>
+            <a:graphicFrameLocks noGrp="1"/>
+          </p:cNvGraphicFramePr>
+          <p:nvPr>
+            <p:extLst>
+              <p:ext uri="{D42A27DB-BD31-4B8C-83A1-F6EECF244321}">
+                <p14:modId xmlns:p14="http://schemas.microsoft.com/office/powerpoint/2010/main" val="3312233306"/>
+              </p:ext>
+            </p:extLst>
+          </p:nvPr>
+        </p:nvGraphicFramePr>
+        <p:xfrm>
+          <a:off x="425002" y="2035243"/>
+          <a:ext cx="9646276" cy="4822757"/>
+        </p:xfrm>
+        <a:graphic>
+          <a:graphicData uri="http://schemas.openxmlformats.org/drawingml/2006/table">
+            <a:tbl>
+              <a:tblPr firstRow="1" bandRow="1">
+                <a:tableStyleId>{5C22544A-7EE6-4342-B048-85BDC9FD1C3A}</a:tableStyleId>
+              </a:tblPr>
+              <a:tblGrid>
+                <a:gridCol w="2043294">
+                  <a:extLst>
+                    <a:ext uri="{9D8B030D-6E8A-4147-A177-3AD203B41FA5}">
+                      <a16:colId xmlns:a16="http://schemas.microsoft.com/office/drawing/2014/main" val="2603635950"/>
+                    </a:ext>
+                  </a:extLst>
+                </a:gridCol>
+                <a:gridCol w="1046281">
+                  <a:extLst>
+                    <a:ext uri="{9D8B030D-6E8A-4147-A177-3AD203B41FA5}">
+                      <a16:colId xmlns:a16="http://schemas.microsoft.com/office/drawing/2014/main" val="1630367279"/>
+                    </a:ext>
+                  </a:extLst>
+                </a:gridCol>
+                <a:gridCol w="2448341">
+                  <a:extLst>
+                    <a:ext uri="{9D8B030D-6E8A-4147-A177-3AD203B41FA5}">
+                      <a16:colId xmlns:a16="http://schemas.microsoft.com/office/drawing/2014/main" val="1244519568"/>
+                    </a:ext>
+                  </a:extLst>
+                </a:gridCol>
+                <a:gridCol w="2029747">
+                  <a:extLst>
+                    <a:ext uri="{9D8B030D-6E8A-4147-A177-3AD203B41FA5}">
+                      <a16:colId xmlns:a16="http://schemas.microsoft.com/office/drawing/2014/main" val="3491636567"/>
+                    </a:ext>
+                  </a:extLst>
+                </a:gridCol>
+                <a:gridCol w="2078613">
+                  <a:extLst>
+                    <a:ext uri="{9D8B030D-6E8A-4147-A177-3AD203B41FA5}">
+                      <a16:colId xmlns:a16="http://schemas.microsoft.com/office/drawing/2014/main" val="1537263246"/>
+                    </a:ext>
+                  </a:extLst>
+                </a:gridCol>
+              </a:tblGrid>
+              <a:tr h="616517">
+                <a:tc>
+                  <a:txBody>
+                    <a:bodyPr/>
+                    <a:lstStyle/>
+                    <a:p>
+                      <a:r>
+                        <a:rPr lang="en-US" altLang="zh-CN" sz="2000" dirty="0">
+                          <a:latin typeface="Times New Roman" panose="02020603050405020304" pitchFamily="18" charset="0"/>
+                          <a:cs typeface="Times New Roman" panose="02020603050405020304" pitchFamily="18" charset="0"/>
+                        </a:rPr>
+                        <a:t>Num core</a:t>
+                      </a:r>
+                      <a:endParaRPr lang="zh-CN" altLang="en-US" sz="2000" dirty="0">
+                        <a:latin typeface="Times New Roman" panose="02020603050405020304" pitchFamily="18" charset="0"/>
+                        <a:cs typeface="Times New Roman" panose="02020603050405020304" pitchFamily="18" charset="0"/>
+                      </a:endParaRPr>
+                    </a:p>
+                  </a:txBody>
+                  <a:tcPr/>
+                </a:tc>
+                <a:tc>
+                  <a:txBody>
+                    <a:bodyPr/>
+                    <a:lstStyle/>
+                    <a:p>
+                      <a:r>
+                        <a:rPr lang="en-US" altLang="zh-CN" sz="2000" dirty="0">
+                          <a:latin typeface="Times New Roman" panose="02020603050405020304" pitchFamily="18" charset="0"/>
+                          <a:cs typeface="Times New Roman" panose="02020603050405020304" pitchFamily="18" charset="0"/>
+                        </a:rPr>
+                        <a:t>JOBID</a:t>
+                      </a:r>
+                      <a:endParaRPr lang="zh-CN" altLang="en-US" sz="2000" dirty="0">
+                        <a:latin typeface="Times New Roman" panose="02020603050405020304" pitchFamily="18" charset="0"/>
+                        <a:cs typeface="Times New Roman" panose="02020603050405020304" pitchFamily="18" charset="0"/>
+                      </a:endParaRPr>
+                    </a:p>
+                  </a:txBody>
+                  <a:tcPr/>
+                </a:tc>
+                <a:tc>
+                  <a:txBody>
+                    <a:bodyPr/>
+                    <a:lstStyle/>
+                    <a:p>
+                      <a:r>
+                        <a:rPr lang="en-US" altLang="zh-CN" sz="2000" dirty="0">
+                          <a:latin typeface="Times New Roman" panose="02020603050405020304" pitchFamily="18" charset="0"/>
+                          <a:cs typeface="Times New Roman" panose="02020603050405020304" pitchFamily="18" charset="0"/>
+                        </a:rPr>
+                        <a:t>Num thread</a:t>
+                      </a:r>
+                      <a:endParaRPr lang="zh-CN" altLang="en-US" sz="2000" dirty="0">
+                        <a:latin typeface="Times New Roman" panose="02020603050405020304" pitchFamily="18" charset="0"/>
+                        <a:cs typeface="Times New Roman" panose="02020603050405020304" pitchFamily="18" charset="0"/>
+                      </a:endParaRPr>
+                    </a:p>
+                  </a:txBody>
+                  <a:tcPr/>
+                </a:tc>
+                <a:tc>
+                  <a:txBody>
+                    <a:bodyPr/>
+                    <a:lstStyle/>
+                    <a:p>
+                      <a:r>
+                        <a:rPr lang="en-US" altLang="zh-CN" sz="2000" dirty="0">
+                          <a:latin typeface="Times New Roman" panose="02020603050405020304" pitchFamily="18" charset="0"/>
+                          <a:cs typeface="Times New Roman" panose="02020603050405020304" pitchFamily="18" charset="0"/>
+                        </a:rPr>
+                        <a:t>speed</a:t>
+                      </a:r>
+                      <a:endParaRPr lang="zh-CN" altLang="en-US" sz="2000" dirty="0">
+                        <a:latin typeface="Times New Roman" panose="02020603050405020304" pitchFamily="18" charset="0"/>
+                        <a:cs typeface="Times New Roman" panose="02020603050405020304" pitchFamily="18" charset="0"/>
+                      </a:endParaRPr>
+                    </a:p>
+                  </a:txBody>
+                  <a:tcPr/>
+                </a:tc>
+                <a:tc>
+                  <a:txBody>
+                    <a:bodyPr/>
+                    <a:lstStyle/>
+                    <a:p>
+                      <a:endParaRPr lang="zh-CN" altLang="en-US" sz="2000" dirty="0">
+                        <a:latin typeface="Times New Roman" panose="02020603050405020304" pitchFamily="18" charset="0"/>
+                        <a:cs typeface="Times New Roman" panose="02020603050405020304" pitchFamily="18" charset="0"/>
+                      </a:endParaRPr>
+                    </a:p>
+                  </a:txBody>
+                  <a:tcPr/>
+                </a:tc>
+                <a:extLst>
+                  <a:ext uri="{0D108BD9-81ED-4DB2-BD59-A6C34878D82A}">
+                    <a16:rowId xmlns:a16="http://schemas.microsoft.com/office/drawing/2014/main" val="1140407429"/>
+                  </a:ext>
+                </a:extLst>
+              </a:tr>
+              <a:tr h="517872">
+                <a:tc>
+                  <a:txBody>
+                    <a:bodyPr/>
+                    <a:lstStyle/>
+                    <a:p>
+                      <a:r>
+                        <a:rPr lang="en-US" altLang="zh-CN" sz="2000" dirty="0">
+                          <a:latin typeface="Times New Roman" panose="02020603050405020304" pitchFamily="18" charset="0"/>
+                          <a:cs typeface="Times New Roman" panose="02020603050405020304" pitchFamily="18" charset="0"/>
+                        </a:rPr>
+                        <a:t>2 exclusive nodes</a:t>
+                      </a:r>
+                      <a:endParaRPr lang="zh-CN" altLang="en-US" sz="2000" dirty="0">
+                        <a:latin typeface="Times New Roman" panose="02020603050405020304" pitchFamily="18" charset="0"/>
+                        <a:cs typeface="Times New Roman" panose="02020603050405020304" pitchFamily="18" charset="0"/>
+                      </a:endParaRPr>
+                    </a:p>
+                  </a:txBody>
+                  <a:tcPr/>
+                </a:tc>
+                <a:tc>
+                  <a:txBody>
+                    <a:bodyPr/>
+                    <a:lstStyle/>
+                    <a:p>
+                      <a:r>
+                        <a:rPr lang="en-US" altLang="zh-CN" sz="2000" dirty="0">
+                          <a:latin typeface="Times New Roman" panose="02020603050405020304" pitchFamily="18" charset="0"/>
+                          <a:cs typeface="Times New Roman" panose="02020603050405020304" pitchFamily="18" charset="0"/>
+                        </a:rPr>
+                        <a:t>393458</a:t>
+                      </a:r>
+                    </a:p>
+                  </a:txBody>
+                  <a:tcPr/>
+                </a:tc>
+                <a:tc>
+                  <a:txBody>
+                    <a:bodyPr/>
+                    <a:lstStyle/>
+                    <a:p>
+                      <a:r>
+                        <a:rPr lang="en-US" altLang="zh-CN" sz="2000" dirty="0">
+                          <a:latin typeface="Times New Roman" panose="02020603050405020304" pitchFamily="18" charset="0"/>
+                          <a:cs typeface="Times New Roman" panose="02020603050405020304" pitchFamily="18" charset="0"/>
+                        </a:rPr>
+                        <a:t>8 process, each 24 threads</a:t>
+                      </a:r>
+                      <a:endParaRPr lang="zh-CN" altLang="en-US" sz="2000" dirty="0">
+                        <a:latin typeface="Times New Roman" panose="02020603050405020304" pitchFamily="18" charset="0"/>
+                        <a:cs typeface="Times New Roman" panose="02020603050405020304" pitchFamily="18" charset="0"/>
+                      </a:endParaRPr>
+                    </a:p>
+                  </a:txBody>
+                  <a:tcPr/>
+                </a:tc>
+                <a:tc>
+                  <a:txBody>
+                    <a:bodyPr/>
+                    <a:lstStyle/>
+                    <a:p>
+                      <a:endParaRPr lang="zh-CN" altLang="en-US" sz="2000" dirty="0">
+                        <a:latin typeface="Times New Roman" panose="02020603050405020304" pitchFamily="18" charset="0"/>
+                        <a:cs typeface="Times New Roman" panose="02020603050405020304" pitchFamily="18" charset="0"/>
+                      </a:endParaRPr>
+                    </a:p>
+                  </a:txBody>
+                  <a:tcPr/>
+                </a:tc>
+                <a:tc>
+                  <a:txBody>
+                    <a:bodyPr/>
+                    <a:lstStyle/>
+                    <a:p>
+                      <a:endParaRPr lang="zh-CN" altLang="en-US" sz="2000" dirty="0">
+                        <a:latin typeface="Times New Roman" panose="02020603050405020304" pitchFamily="18" charset="0"/>
+                        <a:cs typeface="Times New Roman" panose="02020603050405020304" pitchFamily="18" charset="0"/>
+                      </a:endParaRPr>
+                    </a:p>
+                  </a:txBody>
+                  <a:tcPr/>
+                </a:tc>
+                <a:extLst>
+                  <a:ext uri="{0D108BD9-81ED-4DB2-BD59-A6C34878D82A}">
+                    <a16:rowId xmlns:a16="http://schemas.microsoft.com/office/drawing/2014/main" val="2733459114"/>
+                  </a:ext>
+                </a:extLst>
+              </a:tr>
+              <a:tr h="517872">
+                <a:tc>
+                  <a:txBody>
+                    <a:bodyPr/>
+                    <a:lstStyle/>
+                    <a:p>
+                      <a:r>
+                        <a:rPr lang="en-US" altLang="zh-CN" sz="2000" dirty="0">
+                          <a:latin typeface="Times New Roman" panose="02020603050405020304" pitchFamily="18" charset="0"/>
+                          <a:cs typeface="Times New Roman" panose="02020603050405020304" pitchFamily="18" charset="0"/>
+                        </a:rPr>
+                        <a:t>4 exclusive nodes</a:t>
+                      </a:r>
+                      <a:endParaRPr lang="zh-CN" altLang="en-US" sz="2000" dirty="0">
+                        <a:latin typeface="Times New Roman" panose="02020603050405020304" pitchFamily="18" charset="0"/>
+                        <a:cs typeface="Times New Roman" panose="02020603050405020304" pitchFamily="18" charset="0"/>
+                      </a:endParaRPr>
+                    </a:p>
+                  </a:txBody>
+                  <a:tcPr/>
+                </a:tc>
+                <a:tc>
+                  <a:txBody>
+                    <a:bodyPr/>
+                    <a:lstStyle/>
+                    <a:p>
+                      <a:r>
+                        <a:rPr lang="en-US" altLang="zh-CN" sz="2000" dirty="0">
+                          <a:latin typeface="Times New Roman" panose="02020603050405020304" pitchFamily="18" charset="0"/>
+                          <a:cs typeface="Times New Roman" panose="02020603050405020304" pitchFamily="18" charset="0"/>
+                        </a:rPr>
+                        <a:t>393234</a:t>
+                      </a:r>
+                    </a:p>
+                    <a:p>
+                      <a:endParaRPr lang="en-US" altLang="zh-CN" sz="2000" dirty="0">
+                        <a:latin typeface="Times New Roman" panose="02020603050405020304" pitchFamily="18" charset="0"/>
+                        <a:cs typeface="Times New Roman" panose="02020603050405020304" pitchFamily="18" charset="0"/>
+                      </a:endParaRPr>
+                    </a:p>
+                  </a:txBody>
+                  <a:tcPr/>
+                </a:tc>
+                <a:tc>
+                  <a:txBody>
+                    <a:bodyPr/>
+                    <a:lstStyle/>
+                    <a:p>
+                      <a:r>
+                        <a:rPr lang="en-US" altLang="zh-CN" sz="2000" dirty="0">
+                          <a:latin typeface="Times New Roman" panose="02020603050405020304" pitchFamily="18" charset="0"/>
+                          <a:cs typeface="Times New Roman" panose="02020603050405020304" pitchFamily="18" charset="0"/>
+                        </a:rPr>
+                        <a:t>4 process, each 48 threads</a:t>
+                      </a:r>
+                    </a:p>
+                  </a:txBody>
+                  <a:tcPr/>
+                </a:tc>
+                <a:tc>
+                  <a:txBody>
+                    <a:bodyPr/>
+                    <a:lstStyle/>
+                    <a:p>
+                      <a:endParaRPr lang="zh-CN" altLang="en-US" sz="2000" dirty="0">
+                        <a:latin typeface="Times New Roman" panose="02020603050405020304" pitchFamily="18" charset="0"/>
+                        <a:cs typeface="Times New Roman" panose="02020603050405020304" pitchFamily="18" charset="0"/>
+                      </a:endParaRPr>
+                    </a:p>
+                  </a:txBody>
+                  <a:tcPr/>
+                </a:tc>
+                <a:tc>
+                  <a:txBody>
+                    <a:bodyPr/>
+                    <a:lstStyle/>
+                    <a:p>
+                      <a:endParaRPr lang="zh-CN" altLang="en-US" sz="2000" dirty="0">
+                        <a:latin typeface="Times New Roman" panose="02020603050405020304" pitchFamily="18" charset="0"/>
+                        <a:cs typeface="Times New Roman" panose="02020603050405020304" pitchFamily="18" charset="0"/>
+                      </a:endParaRPr>
+                    </a:p>
+                  </a:txBody>
+                  <a:tcPr/>
+                </a:tc>
+                <a:extLst>
+                  <a:ext uri="{0D108BD9-81ED-4DB2-BD59-A6C34878D82A}">
+                    <a16:rowId xmlns:a16="http://schemas.microsoft.com/office/drawing/2014/main" val="1666228950"/>
+                  </a:ext>
+                </a:extLst>
+              </a:tr>
+              <a:tr h="517872">
+                <a:tc>
+                  <a:txBody>
+                    <a:bodyPr/>
+                    <a:lstStyle/>
+                    <a:p>
+                      <a:r>
+                        <a:rPr lang="en-US" altLang="zh-CN" sz="2000" dirty="0">
+                          <a:latin typeface="Times New Roman" panose="02020603050405020304" pitchFamily="18" charset="0"/>
+                          <a:cs typeface="Times New Roman" panose="02020603050405020304" pitchFamily="18" charset="0"/>
+                        </a:rPr>
+                        <a:t>Two exclusive nodes</a:t>
+                      </a:r>
+                      <a:endParaRPr lang="zh-CN" altLang="en-US" sz="2000" dirty="0">
+                        <a:latin typeface="Times New Roman" panose="02020603050405020304" pitchFamily="18" charset="0"/>
+                        <a:cs typeface="Times New Roman" panose="02020603050405020304" pitchFamily="18" charset="0"/>
+                      </a:endParaRPr>
+                    </a:p>
+                  </a:txBody>
+                  <a:tcPr/>
+                </a:tc>
+                <a:tc>
+                  <a:txBody>
+                    <a:bodyPr/>
+                    <a:lstStyle/>
+                    <a:p>
+                      <a:pPr marL="0" marR="0" lvl="0" indent="0" algn="l" defTabSz="914400" rtl="0" eaLnBrk="1" fontAlgn="auto" latinLnBrk="0" hangingPunct="1">
+                        <a:lnSpc>
+                          <a:spcPct val="100000"/>
+                        </a:lnSpc>
+                        <a:spcBef>
+                          <a:spcPts val="0"/>
+                        </a:spcBef>
+                        <a:spcAft>
+                          <a:spcPts val="0"/>
+                        </a:spcAft>
+                        <a:buClrTx/>
+                        <a:buSzTx/>
+                        <a:buFontTx/>
+                        <a:buNone/>
+                        <a:tabLst/>
+                        <a:defRPr/>
+                      </a:pPr>
+                      <a:r>
+                        <a:rPr lang="en-US" altLang="zh-CN" sz="2000" dirty="0">
+                          <a:latin typeface="Times New Roman" panose="02020603050405020304" pitchFamily="18" charset="0"/>
+                          <a:cs typeface="Times New Roman" panose="02020603050405020304" pitchFamily="18" charset="0"/>
+                        </a:rPr>
+                        <a:t>393210</a:t>
+                      </a:r>
+                    </a:p>
+                    <a:p>
+                      <a:pPr marL="0" marR="0" lvl="0" indent="0" algn="l" defTabSz="914400" rtl="0" eaLnBrk="1" fontAlgn="auto" latinLnBrk="0" hangingPunct="1">
+                        <a:lnSpc>
+                          <a:spcPct val="100000"/>
+                        </a:lnSpc>
+                        <a:spcBef>
+                          <a:spcPts val="0"/>
+                        </a:spcBef>
+                        <a:spcAft>
+                          <a:spcPts val="0"/>
+                        </a:spcAft>
+                        <a:buClrTx/>
+                        <a:buSzTx/>
+                        <a:buFontTx/>
+                        <a:buNone/>
+                        <a:tabLst/>
+                        <a:defRPr/>
+                      </a:pPr>
+                      <a:endParaRPr lang="en-US" altLang="zh-CN" sz="2000" dirty="0">
+                        <a:latin typeface="Times New Roman" panose="02020603050405020304" pitchFamily="18" charset="0"/>
+                        <a:cs typeface="Times New Roman" panose="02020603050405020304" pitchFamily="18" charset="0"/>
+                      </a:endParaRPr>
+                    </a:p>
+                  </a:txBody>
+                  <a:tcPr/>
+                </a:tc>
+                <a:tc>
+                  <a:txBody>
+                    <a:bodyPr/>
+                    <a:lstStyle/>
+                    <a:p>
+                      <a:r>
+                        <a:rPr lang="en-US" altLang="zh-CN" sz="2000" dirty="0">
+                          <a:latin typeface="Times New Roman" panose="02020603050405020304" pitchFamily="18" charset="0"/>
+                          <a:cs typeface="Times New Roman" panose="02020603050405020304" pitchFamily="18" charset="0"/>
+                        </a:rPr>
+                        <a:t>4 process, each 48 threads</a:t>
+                      </a:r>
+                      <a:endParaRPr lang="zh-CN" altLang="en-US" sz="2000" dirty="0">
+                        <a:latin typeface="Times New Roman" panose="02020603050405020304" pitchFamily="18" charset="0"/>
+                        <a:cs typeface="Times New Roman" panose="02020603050405020304" pitchFamily="18" charset="0"/>
+                      </a:endParaRPr>
+                    </a:p>
+                  </a:txBody>
+                  <a:tcPr/>
+                </a:tc>
+                <a:tc>
+                  <a:txBody>
+                    <a:bodyPr/>
+                    <a:lstStyle/>
+                    <a:p>
+                      <a:endParaRPr lang="zh-CN" altLang="en-US" sz="2000" dirty="0">
+                        <a:latin typeface="Times New Roman" panose="02020603050405020304" pitchFamily="18" charset="0"/>
+                        <a:cs typeface="Times New Roman" panose="02020603050405020304" pitchFamily="18" charset="0"/>
+                      </a:endParaRPr>
+                    </a:p>
+                  </a:txBody>
+                  <a:tcPr/>
+                </a:tc>
+                <a:tc>
+                  <a:txBody>
+                    <a:bodyPr/>
+                    <a:lstStyle/>
+                    <a:p>
+                      <a:endParaRPr lang="zh-CN" altLang="en-US" sz="2000" dirty="0">
+                        <a:latin typeface="Times New Roman" panose="02020603050405020304" pitchFamily="18" charset="0"/>
+                        <a:cs typeface="Times New Roman" panose="02020603050405020304" pitchFamily="18" charset="0"/>
+                      </a:endParaRPr>
+                    </a:p>
+                  </a:txBody>
+                  <a:tcPr/>
+                </a:tc>
+                <a:extLst>
+                  <a:ext uri="{0D108BD9-81ED-4DB2-BD59-A6C34878D82A}">
+                    <a16:rowId xmlns:a16="http://schemas.microsoft.com/office/drawing/2014/main" val="2913943329"/>
+                  </a:ext>
+                </a:extLst>
+              </a:tr>
+              <a:tr h="517872">
+                <a:tc>
+                  <a:txBody>
+                    <a:bodyPr/>
+                    <a:lstStyle/>
+                    <a:p>
+                      <a:r>
+                        <a:rPr lang="en-US" altLang="zh-CN" sz="2000" dirty="0">
+                          <a:latin typeface="Times New Roman" panose="02020603050405020304" pitchFamily="18" charset="0"/>
+                          <a:cs typeface="Times New Roman" panose="02020603050405020304" pitchFamily="18" charset="0"/>
+                        </a:rPr>
+                        <a:t>Exclusive node</a:t>
+                      </a:r>
+                      <a:endParaRPr lang="zh-CN" altLang="en-US" sz="2000" dirty="0">
+                        <a:latin typeface="Times New Roman" panose="02020603050405020304" pitchFamily="18" charset="0"/>
+                        <a:cs typeface="Times New Roman" panose="02020603050405020304" pitchFamily="18" charset="0"/>
+                      </a:endParaRPr>
+                    </a:p>
+                  </a:txBody>
+                  <a:tcPr/>
+                </a:tc>
+                <a:tc>
+                  <a:txBody>
+                    <a:bodyPr/>
+                    <a:lstStyle/>
+                    <a:p>
+                      <a:pPr marL="0" marR="0" lvl="0" indent="0" algn="l" defTabSz="914400" rtl="0" eaLnBrk="1" fontAlgn="auto" latinLnBrk="0" hangingPunct="1">
+                        <a:lnSpc>
+                          <a:spcPct val="100000"/>
+                        </a:lnSpc>
+                        <a:spcBef>
+                          <a:spcPts val="0"/>
+                        </a:spcBef>
+                        <a:spcAft>
+                          <a:spcPts val="0"/>
+                        </a:spcAft>
+                        <a:buClrTx/>
+                        <a:buSzTx/>
+                        <a:buFontTx/>
+                        <a:buNone/>
+                        <a:tabLst/>
+                        <a:defRPr/>
+                      </a:pPr>
+                      <a:r>
+                        <a:rPr lang="en-US" altLang="zh-CN" sz="2000" dirty="0">
+                          <a:latin typeface="Times New Roman" panose="02020603050405020304" pitchFamily="18" charset="0"/>
+                          <a:cs typeface="Times New Roman" panose="02020603050405020304" pitchFamily="18" charset="0"/>
+                        </a:rPr>
+                        <a:t>393123</a:t>
+                      </a:r>
+                    </a:p>
+                  </a:txBody>
+                  <a:tcPr/>
+                </a:tc>
+                <a:tc>
+                  <a:txBody>
+                    <a:bodyPr/>
+                    <a:lstStyle/>
+                    <a:p>
+                      <a:r>
+                        <a:rPr lang="en-US" altLang="zh-CN" sz="2000" dirty="0">
+                          <a:latin typeface="Times New Roman" panose="02020603050405020304" pitchFamily="18" charset="0"/>
+                          <a:cs typeface="Times New Roman" panose="02020603050405020304" pitchFamily="18" charset="0"/>
+                        </a:rPr>
+                        <a:t>Single process, 48 threads, binding </a:t>
+                      </a:r>
+                      <a:r>
+                        <a:rPr lang="en-US" altLang="zh-CN" sz="2000" dirty="0" err="1">
+                          <a:latin typeface="Times New Roman" panose="02020603050405020304" pitchFamily="18" charset="0"/>
+                          <a:cs typeface="Times New Roman" panose="02020603050405020304" pitchFamily="18" charset="0"/>
+                        </a:rPr>
+                        <a:t>cpu</a:t>
+                      </a:r>
+                      <a:endParaRPr lang="zh-CN" altLang="en-US" sz="2000" dirty="0">
+                        <a:latin typeface="Times New Roman" panose="02020603050405020304" pitchFamily="18" charset="0"/>
+                        <a:cs typeface="Times New Roman" panose="02020603050405020304" pitchFamily="18" charset="0"/>
+                      </a:endParaRPr>
+                    </a:p>
+                  </a:txBody>
+                  <a:tcPr/>
+                </a:tc>
+                <a:tc>
+                  <a:txBody>
+                    <a:bodyPr/>
+                    <a:lstStyle/>
+                    <a:p>
+                      <a:endParaRPr lang="zh-CN" altLang="en-US" sz="2000" dirty="0">
+                        <a:latin typeface="Times New Roman" panose="02020603050405020304" pitchFamily="18" charset="0"/>
+                        <a:cs typeface="Times New Roman" panose="02020603050405020304" pitchFamily="18" charset="0"/>
+                      </a:endParaRPr>
+                    </a:p>
+                  </a:txBody>
+                  <a:tcPr/>
+                </a:tc>
+                <a:tc>
+                  <a:txBody>
+                    <a:bodyPr/>
+                    <a:lstStyle/>
+                    <a:p>
+                      <a:endParaRPr lang="zh-CN" altLang="en-US" sz="2000" dirty="0">
+                        <a:latin typeface="Times New Roman" panose="02020603050405020304" pitchFamily="18" charset="0"/>
+                        <a:cs typeface="Times New Roman" panose="02020603050405020304" pitchFamily="18" charset="0"/>
+                      </a:endParaRPr>
+                    </a:p>
+                  </a:txBody>
+                  <a:tcPr/>
+                </a:tc>
+                <a:extLst>
+                  <a:ext uri="{0D108BD9-81ED-4DB2-BD59-A6C34878D82A}">
+                    <a16:rowId xmlns:a16="http://schemas.microsoft.com/office/drawing/2014/main" val="666918307"/>
+                  </a:ext>
+                </a:extLst>
+              </a:tr>
+              <a:tr h="517872">
+                <a:tc>
+                  <a:txBody>
+                    <a:bodyPr/>
+                    <a:lstStyle/>
+                    <a:p>
+                      <a:r>
+                        <a:rPr lang="en-US" altLang="zh-CN" sz="2000" dirty="0">
+                          <a:latin typeface="Times New Roman" panose="02020603050405020304" pitchFamily="18" charset="0"/>
+                          <a:cs typeface="Times New Roman" panose="02020603050405020304" pitchFamily="18" charset="0"/>
+                        </a:rPr>
+                        <a:t>Exclusive node</a:t>
+                      </a:r>
+                      <a:endParaRPr lang="zh-CN" altLang="en-US" sz="2000" dirty="0">
+                        <a:latin typeface="Times New Roman" panose="02020603050405020304" pitchFamily="18" charset="0"/>
+                        <a:cs typeface="Times New Roman" panose="02020603050405020304" pitchFamily="18" charset="0"/>
+                      </a:endParaRPr>
+                    </a:p>
+                  </a:txBody>
+                  <a:tcPr/>
+                </a:tc>
+                <a:tc>
+                  <a:txBody>
+                    <a:bodyPr/>
+                    <a:lstStyle/>
+                    <a:p>
+                      <a:pPr marL="0" marR="0" lvl="0" indent="0" algn="l" defTabSz="914400" rtl="0" eaLnBrk="1" fontAlgn="auto" latinLnBrk="0" hangingPunct="1">
+                        <a:lnSpc>
+                          <a:spcPct val="100000"/>
+                        </a:lnSpc>
+                        <a:spcBef>
+                          <a:spcPts val="0"/>
+                        </a:spcBef>
+                        <a:spcAft>
+                          <a:spcPts val="0"/>
+                        </a:spcAft>
+                        <a:buClrTx/>
+                        <a:buSzTx/>
+                        <a:buFontTx/>
+                        <a:buNone/>
+                        <a:tabLst/>
+                        <a:defRPr/>
+                      </a:pPr>
+                      <a:r>
+                        <a:rPr lang="en-US" altLang="zh-CN" sz="2000" dirty="0">
+                          <a:latin typeface="Times New Roman" panose="02020603050405020304" pitchFamily="18" charset="0"/>
+                          <a:cs typeface="Times New Roman" panose="02020603050405020304" pitchFamily="18" charset="0"/>
+                        </a:rPr>
+                        <a:t>393045</a:t>
+                      </a:r>
+                    </a:p>
+                  </a:txBody>
+                  <a:tcPr/>
+                </a:tc>
+                <a:tc>
+                  <a:txBody>
+                    <a:bodyPr/>
+                    <a:lstStyle/>
+                    <a:p>
+                      <a:r>
+                        <a:rPr lang="en-US" altLang="zh-CN" sz="2000" dirty="0">
+                          <a:latin typeface="Times New Roman" panose="02020603050405020304" pitchFamily="18" charset="0"/>
+                          <a:cs typeface="Times New Roman" panose="02020603050405020304" pitchFamily="18" charset="0"/>
+                        </a:rPr>
+                        <a:t>Single process, 24, threads, binding </a:t>
+                      </a:r>
+                      <a:r>
+                        <a:rPr lang="en-US" altLang="zh-CN" sz="2000" dirty="0" err="1">
+                          <a:latin typeface="Times New Roman" panose="02020603050405020304" pitchFamily="18" charset="0"/>
+                          <a:cs typeface="Times New Roman" panose="02020603050405020304" pitchFamily="18" charset="0"/>
+                        </a:rPr>
+                        <a:t>cpu</a:t>
+                      </a:r>
+                      <a:endParaRPr lang="zh-CN" altLang="en-US" sz="2000" dirty="0">
+                        <a:latin typeface="Times New Roman" panose="02020603050405020304" pitchFamily="18" charset="0"/>
+                        <a:cs typeface="Times New Roman" panose="02020603050405020304" pitchFamily="18" charset="0"/>
+                      </a:endParaRPr>
+                    </a:p>
+                  </a:txBody>
+                  <a:tcPr/>
+                </a:tc>
+                <a:tc>
+                  <a:txBody>
+                    <a:bodyPr/>
+                    <a:lstStyle/>
+                    <a:p>
+                      <a:endParaRPr lang="zh-CN" altLang="en-US" sz="2000" dirty="0">
+                        <a:latin typeface="Times New Roman" panose="02020603050405020304" pitchFamily="18" charset="0"/>
+                        <a:cs typeface="Times New Roman" panose="02020603050405020304" pitchFamily="18" charset="0"/>
+                      </a:endParaRPr>
+                    </a:p>
+                  </a:txBody>
+                  <a:tcPr/>
+                </a:tc>
+                <a:tc>
+                  <a:txBody>
+                    <a:bodyPr/>
+                    <a:lstStyle/>
+                    <a:p>
+                      <a:endParaRPr lang="zh-CN" altLang="en-US" sz="2000" dirty="0">
+                        <a:latin typeface="Times New Roman" panose="02020603050405020304" pitchFamily="18" charset="0"/>
+                        <a:cs typeface="Times New Roman" panose="02020603050405020304" pitchFamily="18" charset="0"/>
+                      </a:endParaRPr>
+                    </a:p>
+                  </a:txBody>
+                  <a:tcPr/>
+                </a:tc>
+                <a:extLst>
+                  <a:ext uri="{0D108BD9-81ED-4DB2-BD59-A6C34878D82A}">
+                    <a16:rowId xmlns:a16="http://schemas.microsoft.com/office/drawing/2014/main" val="2699179161"/>
+                  </a:ext>
+                </a:extLst>
+              </a:tr>
+              <a:tr h="517872">
+                <a:tc>
+                  <a:txBody>
+                    <a:bodyPr/>
+                    <a:lstStyle/>
+                    <a:p>
+                      <a:r>
+                        <a:rPr lang="en-US" altLang="zh-CN" sz="2000" dirty="0">
+                          <a:latin typeface="Times New Roman" panose="02020603050405020304" pitchFamily="18" charset="0"/>
+                          <a:cs typeface="Times New Roman" panose="02020603050405020304" pitchFamily="18" charset="0"/>
+                        </a:rPr>
+                        <a:t>2 exclusive nodes</a:t>
+                      </a:r>
+                      <a:endParaRPr lang="zh-CN" altLang="en-US" sz="2000" dirty="0">
+                        <a:latin typeface="Times New Roman" panose="02020603050405020304" pitchFamily="18" charset="0"/>
+                        <a:cs typeface="Times New Roman" panose="02020603050405020304" pitchFamily="18" charset="0"/>
+                      </a:endParaRPr>
+                    </a:p>
+                  </a:txBody>
+                  <a:tcPr/>
+                </a:tc>
+                <a:tc>
+                  <a:txBody>
+                    <a:bodyPr/>
+                    <a:lstStyle/>
+                    <a:p>
+                      <a:pPr marL="0" marR="0" lvl="0" indent="0" algn="l" defTabSz="914400" rtl="0" eaLnBrk="1" fontAlgn="auto" latinLnBrk="0" hangingPunct="1">
+                        <a:lnSpc>
+                          <a:spcPct val="100000"/>
+                        </a:lnSpc>
+                        <a:spcBef>
+                          <a:spcPts val="0"/>
+                        </a:spcBef>
+                        <a:spcAft>
+                          <a:spcPts val="0"/>
+                        </a:spcAft>
+                        <a:buClrTx/>
+                        <a:buSzTx/>
+                        <a:buFontTx/>
+                        <a:buNone/>
+                        <a:tabLst/>
+                        <a:defRPr/>
+                      </a:pPr>
+                      <a:r>
+                        <a:rPr lang="en-US" altLang="zh-CN" sz="2000" dirty="0">
+                          <a:latin typeface="Times New Roman" panose="02020603050405020304" pitchFamily="18" charset="0"/>
+                          <a:cs typeface="Times New Roman" panose="02020603050405020304" pitchFamily="18" charset="0"/>
+                        </a:rPr>
+                        <a:t>391740</a:t>
+                      </a:r>
+                    </a:p>
+                  </a:txBody>
+                  <a:tcPr/>
+                </a:tc>
+                <a:tc>
+                  <a:txBody>
+                    <a:bodyPr/>
+                    <a:lstStyle/>
+                    <a:p>
+                      <a:r>
+                        <a:rPr lang="en-US" altLang="zh-CN" sz="2000" dirty="0">
+                          <a:latin typeface="Times New Roman" panose="02020603050405020304" pitchFamily="18" charset="0"/>
+                          <a:cs typeface="Times New Roman" panose="02020603050405020304" pitchFamily="18" charset="0"/>
+                        </a:rPr>
+                        <a:t>4 process, each 24 threads</a:t>
+                      </a:r>
+                      <a:endParaRPr lang="zh-CN" altLang="en-US" sz="2000" dirty="0">
+                        <a:latin typeface="Times New Roman" panose="02020603050405020304" pitchFamily="18" charset="0"/>
+                        <a:cs typeface="Times New Roman" panose="02020603050405020304" pitchFamily="18" charset="0"/>
+                      </a:endParaRPr>
+                    </a:p>
+                  </a:txBody>
+                  <a:tcPr/>
+                </a:tc>
+                <a:tc>
+                  <a:txBody>
+                    <a:bodyPr/>
+                    <a:lstStyle/>
+                    <a:p>
+                      <a:endParaRPr lang="zh-CN" altLang="en-US" sz="2000" dirty="0">
+                        <a:latin typeface="Times New Roman" panose="02020603050405020304" pitchFamily="18" charset="0"/>
+                        <a:cs typeface="Times New Roman" panose="02020603050405020304" pitchFamily="18" charset="0"/>
+                      </a:endParaRPr>
+                    </a:p>
+                  </a:txBody>
+                  <a:tcPr/>
+                </a:tc>
+                <a:tc>
+                  <a:txBody>
+                    <a:bodyPr/>
+                    <a:lstStyle/>
+                    <a:p>
+                      <a:endParaRPr lang="zh-CN" altLang="en-US" sz="2000" dirty="0">
+                        <a:latin typeface="Times New Roman" panose="02020603050405020304" pitchFamily="18" charset="0"/>
+                        <a:cs typeface="Times New Roman" panose="02020603050405020304" pitchFamily="18" charset="0"/>
+                      </a:endParaRPr>
+                    </a:p>
+                  </a:txBody>
+                  <a:tcPr/>
+                </a:tc>
+                <a:extLst>
+                  <a:ext uri="{0D108BD9-81ED-4DB2-BD59-A6C34878D82A}">
+                    <a16:rowId xmlns:a16="http://schemas.microsoft.com/office/drawing/2014/main" val="630919638"/>
+                  </a:ext>
+                </a:extLst>
+              </a:tr>
+            </a:tbl>
+          </a:graphicData>
+        </a:graphic>
+      </p:graphicFrame>
+    </p:spTree>
+    <p:extLst>
+      <p:ext uri="{BB962C8B-B14F-4D97-AF65-F5344CB8AC3E}">
+        <p14:creationId xmlns:p14="http://schemas.microsoft.com/office/powerpoint/2010/main" val="2609920457"/>
+      </p:ext>
+    </p:extLst>
+  </p:cSld>
+  <p:clrMapOvr>
+    <a:masterClrMapping/>
+  </p:clrMapOvr>
+</p:sld>
+</file>
+
 <file path=ppt/theme/theme1.xml><?xml version="1.0" encoding="utf-8"?>
 <a:theme xmlns:a="http://schemas.openxmlformats.org/drawingml/2006/main" name="Office 主题​​">
   <a:themeElements>

</xml_diff>